<commit_message>
Updates on Modeling Databases slides
</commit_message>
<xml_diff>
--- a/Courses/Software-Sciences/Module-3-Databases-New/07-Modeling-Databases/07-Modeling-Databases.pptx
+++ b/Courses/Software-Sciences/Module-3-Databases-New/07-Modeling-Databases/07-Modeling-Databases.pptx
@@ -469,7 +469,7 @@
           <a:p>
             <a:fld id="{4E087215-0C8F-4762-A664-737A353EC9A4}" type="datetimeFigureOut">
               <a:rPr lang="bg-BG" smtClean="0"/>
-              <a:t>12.4.2024 г.</a:t>
+              <a:t>19.4.2024 г.</a:t>
             </a:fld>
             <a:endParaRPr lang="bg-BG"/>
           </a:p>
@@ -665,7 +665,7 @@
           <a:p>
             <a:fld id="{72D84649-876A-46C9-8472-14CB09C070D8}" type="datetimeFigureOut">
               <a:rPr lang="en-US" smtClean="0"/>
-              <a:t>4/12/2024</a:t>
+              <a:t>4/19/2024</a:t>
             </a:fld>
             <a:endParaRPr lang="en-US"/>
           </a:p>
@@ -16605,7 +16605,7 @@
         </p:blipFill>
         <p:spPr>
           <a:xfrm>
-            <a:off x="1566441" y="3239775"/>
+            <a:off x="1566441" y="3212775"/>
             <a:ext cx="9059117" cy="3294225"/>
           </a:xfrm>
           <a:prstGeom prst="rect">

</xml_diff>